<commit_message>
First set of lessons uploaded
</commit_message>
<xml_diff>
--- a/translations/en-us/Robot/Inspection.pptx
+++ b/translations/en-us/Robot/Inspection.pptx
@@ -202,7 +202,7 @@
           <a:p>
             <a:fld id="{1DA05D45-2BCB-7D45-A4DC-3AF42B1AEA7C}" type="datetimeFigureOut">
               <a:rPr lang="en-US" smtClean="0"/>
-              <a:t>3/4/20</a:t>
+              <a:t>3/6/20</a:t>
             </a:fld>
             <a:endParaRPr lang="en-US"/>
           </a:p>
@@ -2829,7 +2829,7 @@
           <a:p>
             <a:fld id="{F0B0D405-B8F0-F948-B2DC-9AA464B22AC1}" type="datetime1">
               <a:rPr lang="en-US" smtClean="0"/>
-              <a:t>3/4/20</a:t>
+              <a:t>3/6/20</a:t>
             </a:fld>
             <a:endParaRPr lang="en-US"/>
           </a:p>
@@ -5355,7 +5355,7 @@
           <a:p>
             <a:fld id="{82530802-A795-5747-A182-6B03F1EBC304}" type="datetime1">
               <a:rPr lang="en-US" smtClean="0"/>
-              <a:t>3/4/20</a:t>
+              <a:t>3/6/20</a:t>
             </a:fld>
             <a:endParaRPr lang="en-US"/>
           </a:p>
@@ -5596,7 +5596,7 @@
           <a:p>
             <a:fld id="{E5D50E0E-A9F1-FB42-ADBB-EDE1E6B27479}" type="datetime1">
               <a:rPr lang="en-US" smtClean="0"/>
-              <a:t>3/4/20</a:t>
+              <a:t>3/6/20</a:t>
             </a:fld>
             <a:endParaRPr lang="en-US"/>
           </a:p>
@@ -5837,7 +5837,7 @@
           <a:p>
             <a:fld id="{C80E0F62-236C-6D40-B03E-8657E368AB0D}" type="datetime1">
               <a:rPr lang="en-US" smtClean="0"/>
-              <a:t>3/4/20</a:t>
+              <a:t>3/6/20</a:t>
             </a:fld>
             <a:endParaRPr lang="en-US"/>
           </a:p>
@@ -6611,7 +6611,7 @@
           <a:p>
             <a:fld id="{22B5D573-0D16-294D-8030-D4942726067A}" type="datetime1">
               <a:rPr lang="en-US" smtClean="0"/>
-              <a:t>3/4/20</a:t>
+              <a:t>3/6/20</a:t>
             </a:fld>
             <a:endParaRPr lang="en-US"/>
           </a:p>
@@ -7296,7 +7296,7 @@
           <a:p>
             <a:fld id="{AA63BB5A-2DEC-3947-BF15-355EACA9DA7E}" type="datetime1">
               <a:rPr lang="en-US" smtClean="0"/>
-              <a:t>3/4/20</a:t>
+              <a:t>3/6/20</a:t>
             </a:fld>
             <a:endParaRPr lang="en-US"/>
           </a:p>
@@ -8137,7 +8137,7 @@
           <a:p>
             <a:fld id="{1D17B2D4-040A-3E4F-B319-B23E07EE4757}" type="datetime1">
               <a:rPr lang="en-US" smtClean="0"/>
-              <a:t>3/4/20</a:t>
+              <a:t>3/6/20</a:t>
             </a:fld>
             <a:endParaRPr lang="en-US"/>
           </a:p>
@@ -9130,7 +9130,7 @@
           <a:p>
             <a:fld id="{005C86DC-8D3A-C54D-9D3C-414A908A6ADF}" type="datetime1">
               <a:rPr lang="en-US" smtClean="0"/>
-              <a:t>3/4/20</a:t>
+              <a:t>3/6/20</a:t>
             </a:fld>
             <a:endParaRPr lang="en-US"/>
           </a:p>
@@ -11509,7 +11509,7 @@
           <a:p>
             <a:fld id="{0D6AB757-4471-4C4E-93F0-D01CCC335186}" type="datetime1">
               <a:rPr lang="en-US" smtClean="0"/>
-              <a:t>3/4/20</a:t>
+              <a:t>3/6/20</a:t>
             </a:fld>
             <a:endParaRPr lang="en-US"/>
           </a:p>
@@ -11649,7 +11649,7 @@
           <a:p>
             <a:fld id="{CA6B4F35-454D-E844-AA68-A003B59CB69D}" type="datetime1">
               <a:rPr lang="en-US" smtClean="0"/>
-              <a:t>3/4/20</a:t>
+              <a:t>3/6/20</a:t>
             </a:fld>
             <a:endParaRPr lang="en-US"/>
           </a:p>
@@ -12183,7 +12183,7 @@
           <a:p>
             <a:fld id="{0885F534-ECE2-B745-8223-15325D418892}" type="datetime1">
               <a:rPr lang="en-US" smtClean="0"/>
-              <a:t>3/4/20</a:t>
+              <a:t>3/6/20</a:t>
             </a:fld>
             <a:endParaRPr lang="en-US"/>
           </a:p>
@@ -13522,7 +13522,7 @@
           <a:p>
             <a:fld id="{95D45EDE-3D52-5741-BCAE-39EAC69E599F}" type="datetime1">
               <a:rPr lang="en-US" smtClean="0"/>
-              <a:t>3/4/20</a:t>
+              <a:t>3/6/20</a:t>
             </a:fld>
             <a:endParaRPr lang="en-US"/>
           </a:p>
@@ -13786,7 +13786,7 @@
           <a:p>
             <a:fld id="{59864C05-27EE-7E4D-9D71-4F5858FFD300}" type="datetime1">
               <a:rPr lang="en-US" smtClean="0"/>
-              <a:t>3/4/20</a:t>
+              <a:t>3/6/20</a:t>
             </a:fld>
             <a:endParaRPr lang="en-US"/>
           </a:p>
@@ -15554,7 +15554,7 @@
             <a:pPr lvl="1"/>
             <a:r>
               <a:rPr lang="en-US" dirty="0"/>
-              <a:t>On Thursday</a:t>
+              <a:t>On Thursday. This is a full inspection. It can take an hour+</a:t>
             </a:r>
           </a:p>
           <a:p>
@@ -15567,14 +15567,23 @@
           <a:p>
             <a:r>
               <a:rPr lang="en-US" dirty="0"/>
-              <a:t>They will weigh your robot without bumpers and weigh the bumpers separately on Thursday</a:t>
+              <a:t>They will weigh your robot without bumpers and weigh the bumpers separately on Thursday at the Inspection station. After weighing, you will sign up for inspection in your pit.</a:t>
             </a:r>
           </a:p>
           <a:p>
             <a:r>
               <a:rPr lang="en-US" dirty="0"/>
-              <a:t>On Saturday, you will not have to take off the bumpers for the reweighing process</a:t>
+              <a:t>On Saturday, you will not have to take off the bumpers for the reweighing process at the Inspection Station. If your weight has changed, you will have to explain it to the Inspectors.</a:t>
             </a:r>
+          </a:p>
+          <a:p>
+            <a:r>
+              <a:rPr lang="en-US" dirty="0"/>
+              <a:t>Once you have completed inspection on Thursday, you are allowed to fill in for teams who have not shown up for their practice matches. Therefore, it is helpful to complete inspection early in the day.</a:t>
+            </a:r>
+          </a:p>
+          <a:p>
+            <a:endParaRPr lang="en-US" dirty="0"/>
           </a:p>
           <a:p>
             <a:pPr marL="0" indent="0">
@@ -15699,7 +15708,7 @@
           <a:p>
             <a:r>
               <a:rPr lang="en-US" sz="1600" dirty="0"/>
-              <a:t>The framer perimeter, wiring and bumper information is available in the challenge documents (</a:t>
+              <a:t>The frame perimeter, wiring and bumper rules are available in the challenge documents (</a:t>
             </a:r>
             <a:r>
               <a:rPr lang="en-US" sz="1600" dirty="0">
@@ -15715,10 +15724,8 @@
           <a:p>
             <a:r>
               <a:rPr lang="en-US" sz="1600" dirty="0"/>
-              <a:t>The inspection Checklist is provided to all teams in advance so use it to conduct your own inspection the week before. There should be no big surprises</a:t>
+              <a:t>The Inspection Checklist is provided to all teams in advance so use it to conduct your own inspection the week before. There should be no big surprises </a:t>
             </a:r>
-          </a:p>
-          <a:p>
             <a:r>
               <a:rPr lang="en-US" sz="1600" dirty="0">
                 <a:hlinkClick r:id="rId3"/>
@@ -15931,7 +15938,7 @@
           <a:p>
             <a:r>
               <a:rPr lang="en-US" dirty="0"/>
-              <a:t>Robot</a:t>
+              <a:t>Robot with all the mechanisms on it</a:t>
             </a:r>
           </a:p>
           <a:p>

</xml_diff>